<commit_message>
added a safe measure for checking if the user knows to press up or down
</commit_message>
<xml_diff>
--- a/AMT_Images.pptx
+++ b/AMT_Images.pptx
@@ -289,7 +289,7 @@
           <a:p>
             <a:fld id="{5AFCFC37-D217-6D47-A2DB-E79D70B0F320}" type="datetimeFigureOut">
               <a:rPr lang="en-US" smtClean="0"/>
-              <a:t>12/22/15</a:t>
+              <a:t>1/11/16</a:t>
             </a:fld>
             <a:endParaRPr lang="en-US"/>
           </a:p>
@@ -459,7 +459,7 @@
           <a:p>
             <a:fld id="{5AFCFC37-D217-6D47-A2DB-E79D70B0F320}" type="datetimeFigureOut">
               <a:rPr lang="en-US" smtClean="0"/>
-              <a:t>12/22/15</a:t>
+              <a:t>1/11/16</a:t>
             </a:fld>
             <a:endParaRPr lang="en-US"/>
           </a:p>
@@ -639,7 +639,7 @@
           <a:p>
             <a:fld id="{5AFCFC37-D217-6D47-A2DB-E79D70B0F320}" type="datetimeFigureOut">
               <a:rPr lang="en-US" smtClean="0"/>
-              <a:t>12/22/15</a:t>
+              <a:t>1/11/16</a:t>
             </a:fld>
             <a:endParaRPr lang="en-US"/>
           </a:p>
@@ -809,7 +809,7 @@
           <a:p>
             <a:fld id="{5AFCFC37-D217-6D47-A2DB-E79D70B0F320}" type="datetimeFigureOut">
               <a:rPr lang="en-US" smtClean="0"/>
-              <a:t>12/22/15</a:t>
+              <a:t>1/11/16</a:t>
             </a:fld>
             <a:endParaRPr lang="en-US"/>
           </a:p>
@@ -1055,7 +1055,7 @@
           <a:p>
             <a:fld id="{5AFCFC37-D217-6D47-A2DB-E79D70B0F320}" type="datetimeFigureOut">
               <a:rPr lang="en-US" smtClean="0"/>
-              <a:t>12/22/15</a:t>
+              <a:t>1/11/16</a:t>
             </a:fld>
             <a:endParaRPr lang="en-US"/>
           </a:p>
@@ -1343,7 +1343,7 @@
           <a:p>
             <a:fld id="{5AFCFC37-D217-6D47-A2DB-E79D70B0F320}" type="datetimeFigureOut">
               <a:rPr lang="en-US" smtClean="0"/>
-              <a:t>12/22/15</a:t>
+              <a:t>1/11/16</a:t>
             </a:fld>
             <a:endParaRPr lang="en-US"/>
           </a:p>
@@ -1765,7 +1765,7 @@
           <a:p>
             <a:fld id="{5AFCFC37-D217-6D47-A2DB-E79D70B0F320}" type="datetimeFigureOut">
               <a:rPr lang="en-US" smtClean="0"/>
-              <a:t>12/22/15</a:t>
+              <a:t>1/11/16</a:t>
             </a:fld>
             <a:endParaRPr lang="en-US"/>
           </a:p>
@@ -1883,7 +1883,7 @@
           <a:p>
             <a:fld id="{5AFCFC37-D217-6D47-A2DB-E79D70B0F320}" type="datetimeFigureOut">
               <a:rPr lang="en-US" smtClean="0"/>
-              <a:t>12/22/15</a:t>
+              <a:t>1/11/16</a:t>
             </a:fld>
             <a:endParaRPr lang="en-US"/>
           </a:p>
@@ -1978,7 +1978,7 @@
           <a:p>
             <a:fld id="{5AFCFC37-D217-6D47-A2DB-E79D70B0F320}" type="datetimeFigureOut">
               <a:rPr lang="en-US" smtClean="0"/>
-              <a:t>12/22/15</a:t>
+              <a:t>1/11/16</a:t>
             </a:fld>
             <a:endParaRPr lang="en-US"/>
           </a:p>
@@ -2255,7 +2255,7 @@
           <a:p>
             <a:fld id="{5AFCFC37-D217-6D47-A2DB-E79D70B0F320}" type="datetimeFigureOut">
               <a:rPr lang="en-US" smtClean="0"/>
-              <a:t>12/22/15</a:t>
+              <a:t>1/11/16</a:t>
             </a:fld>
             <a:endParaRPr lang="en-US"/>
           </a:p>
@@ -2508,7 +2508,7 @@
           <a:p>
             <a:fld id="{5AFCFC37-D217-6D47-A2DB-E79D70B0F320}" type="datetimeFigureOut">
               <a:rPr lang="en-US" smtClean="0"/>
-              <a:t>12/22/15</a:t>
+              <a:t>1/11/16</a:t>
             </a:fld>
             <a:endParaRPr lang="en-US"/>
           </a:p>
@@ -2721,7 +2721,7 @@
           <a:p>
             <a:fld id="{5AFCFC37-D217-6D47-A2DB-E79D70B0F320}" type="datetimeFigureOut">
               <a:rPr lang="en-US" smtClean="0"/>
-              <a:t>12/22/15</a:t>
+              <a:t>1/11/16</a:t>
             </a:fld>
             <a:endParaRPr lang="en-US"/>
           </a:p>
@@ -3280,7 +3280,7 @@
         </p:nvSpPr>
         <p:spPr>
           <a:xfrm>
-            <a:off x="1274957" y="3862577"/>
+            <a:off x="1474758" y="3862577"/>
             <a:ext cx="2828142" cy="584776"/>
           </a:xfrm>
           <a:prstGeom prst="rect">
@@ -3376,6 +3376,52 @@
           <a:xfrm>
             <a:off x="5309576" y="1945151"/>
             <a:ext cx="2997020" cy="1483674"/>
+          </a:xfrm>
+          <a:prstGeom prst="rect">
+            <a:avLst/>
+          </a:prstGeom>
+        </p:spPr>
+      </p:pic>
+      <p:pic>
+        <p:nvPicPr>
+          <p:cNvPr id="6" name="Picture 5"/>
+          <p:cNvPicPr>
+            <a:picLocks noChangeAspect="1"/>
+          </p:cNvPicPr>
+          <p:nvPr/>
+        </p:nvPicPr>
+        <p:blipFill rotWithShape="1">
+          <a:blip r:embed="rId4"/>
+          <a:srcRect l="30869" t="16546" r="30607" b="49907"/>
+          <a:stretch/>
+        </p:blipFill>
+        <p:spPr>
+          <a:xfrm>
+            <a:off x="2089622" y="4558169"/>
+            <a:ext cx="1630964" cy="1420260"/>
+          </a:xfrm>
+          <a:prstGeom prst="rect">
+            <a:avLst/>
+          </a:prstGeom>
+        </p:spPr>
+      </p:pic>
+      <p:pic>
+        <p:nvPicPr>
+          <p:cNvPr id="10" name="Picture 9"/>
+          <p:cNvPicPr>
+            <a:picLocks noChangeAspect="1"/>
+          </p:cNvPicPr>
+          <p:nvPr/>
+        </p:nvPicPr>
+        <p:blipFill rotWithShape="1">
+          <a:blip r:embed="rId4"/>
+          <a:srcRect l="33570" t="49307" r="32623" b="17975"/>
+          <a:stretch/>
+        </p:blipFill>
+        <p:spPr>
+          <a:xfrm>
+            <a:off x="6161767" y="4558169"/>
+            <a:ext cx="1467494" cy="1420260"/>
           </a:xfrm>
           <a:prstGeom prst="rect">
             <a:avLst/>

</xml_diff>